<commit_message>
Tests for user details model
</commit_message>
<xml_diff>
--- a/PraesentationsConceptual/ProjectPraesentation.pptx
+++ b/PraesentationsConceptual/ProjectPraesentation.pptx
@@ -507,7 +507,7 @@
           <a:p>
             <a:fld id="{DE46CDDC-32D5-4297-B268-762470F0F4D3}" type="datetimeFigureOut">
               <a:rPr lang="de-DE" smtClean="0"/>
-              <a:t>06.07.2020</a:t>
+              <a:t>08.07.2020</a:t>
             </a:fld>
             <a:endParaRPr lang="de-DE"/>
           </a:p>
@@ -672,7 +672,7 @@
           <a:p>
             <a:fld id="{DE46CDDC-32D5-4297-B268-762470F0F4D3}" type="datetimeFigureOut">
               <a:rPr lang="de-DE" smtClean="0"/>
-              <a:t>06.07.2020</a:t>
+              <a:t>08.07.2020</a:t>
             </a:fld>
             <a:endParaRPr lang="de-DE"/>
           </a:p>
@@ -847,7 +847,7 @@
           <a:p>
             <a:fld id="{DE46CDDC-32D5-4297-B268-762470F0F4D3}" type="datetimeFigureOut">
               <a:rPr lang="de-DE" smtClean="0"/>
-              <a:t>06.07.2020</a:t>
+              <a:t>08.07.2020</a:t>
             </a:fld>
             <a:endParaRPr lang="de-DE"/>
           </a:p>
@@ -1016,7 +1016,7 @@
           <a:p>
             <a:fld id="{DE46CDDC-32D5-4297-B268-762470F0F4D3}" type="datetimeFigureOut">
               <a:rPr lang="de-DE" smtClean="0"/>
-              <a:t>06.07.2020</a:t>
+              <a:t>08.07.2020</a:t>
             </a:fld>
             <a:endParaRPr lang="de-DE"/>
           </a:p>
@@ -1471,7 +1471,7 @@
           <a:p>
             <a:fld id="{DE46CDDC-32D5-4297-B268-762470F0F4D3}" type="datetimeFigureOut">
               <a:rPr lang="de-DE" smtClean="0"/>
-              <a:t>06.07.2020</a:t>
+              <a:t>08.07.2020</a:t>
             </a:fld>
             <a:endParaRPr lang="de-DE"/>
           </a:p>
@@ -1735,7 +1735,7 @@
           <a:p>
             <a:fld id="{DE46CDDC-32D5-4297-B268-762470F0F4D3}" type="datetimeFigureOut">
               <a:rPr lang="de-DE" smtClean="0"/>
-              <a:t>06.07.2020</a:t>
+              <a:t>08.07.2020</a:t>
             </a:fld>
             <a:endParaRPr lang="de-DE"/>
           </a:p>
@@ -2109,7 +2109,7 @@
           <a:p>
             <a:fld id="{DE46CDDC-32D5-4297-B268-762470F0F4D3}" type="datetimeFigureOut">
               <a:rPr lang="de-DE" smtClean="0"/>
-              <a:t>06.07.2020</a:t>
+              <a:t>08.07.2020</a:t>
             </a:fld>
             <a:endParaRPr lang="de-DE"/>
           </a:p>
@@ -2231,7 +2231,7 @@
           <a:p>
             <a:fld id="{DE46CDDC-32D5-4297-B268-762470F0F4D3}" type="datetimeFigureOut">
               <a:rPr lang="de-DE" smtClean="0"/>
-              <a:t>06.07.2020</a:t>
+              <a:t>08.07.2020</a:t>
             </a:fld>
             <a:endParaRPr lang="de-DE"/>
           </a:p>
@@ -2321,7 +2321,7 @@
           <a:p>
             <a:fld id="{DE46CDDC-32D5-4297-B268-762470F0F4D3}" type="datetimeFigureOut">
               <a:rPr lang="de-DE" smtClean="0"/>
-              <a:t>06.07.2020</a:t>
+              <a:t>08.07.2020</a:t>
             </a:fld>
             <a:endParaRPr lang="de-DE"/>
           </a:p>
@@ -2570,7 +2570,7 @@
           <a:p>
             <a:fld id="{DE46CDDC-32D5-4297-B268-762470F0F4D3}" type="datetimeFigureOut">
               <a:rPr lang="de-DE" smtClean="0"/>
-              <a:t>06.07.2020</a:t>
+              <a:t>08.07.2020</a:t>
             </a:fld>
             <a:endParaRPr lang="de-DE"/>
           </a:p>
@@ -2829,7 +2829,7 @@
           <a:p>
             <a:fld id="{DE46CDDC-32D5-4297-B268-762470F0F4D3}" type="datetimeFigureOut">
               <a:rPr lang="de-DE" smtClean="0"/>
-              <a:t>06.07.2020</a:t>
+              <a:t>08.07.2020</a:t>
             </a:fld>
             <a:endParaRPr lang="de-DE"/>
           </a:p>
@@ -3233,7 +3233,7 @@
           <a:p>
             <a:fld id="{DE46CDDC-32D5-4297-B268-762470F0F4D3}" type="datetimeFigureOut">
               <a:rPr lang="de-DE" smtClean="0"/>
-              <a:t>06.07.2020</a:t>
+              <a:t>08.07.2020</a:t>
             </a:fld>
             <a:endParaRPr lang="de-DE"/>
           </a:p>
@@ -15924,23 +15924,7 @@
                   <a:schemeClr val="bg1"/>
                 </a:solidFill>
               </a:rPr>
-              <a:t>with</a:t>
-            </a:r>
-            <a:r>
-              <a:rPr lang="de-DE" sz="1400" b="1" dirty="0" smtClean="0">
-                <a:solidFill>
-                  <a:schemeClr val="bg1"/>
-                </a:solidFill>
-              </a:rPr>
-              <a:t> </a:t>
-            </a:r>
-            <a:r>
-              <a:rPr lang="de-DE" sz="1400" b="1" dirty="0" err="1" smtClean="0">
-                <a:solidFill>
-                  <a:schemeClr val="bg1"/>
-                </a:solidFill>
-              </a:rPr>
-              <a:t>number</a:t>
+              <a:t>name</a:t>
             </a:r>
             <a:endParaRPr lang="en-US" sz="1400" b="1" dirty="0">
               <a:solidFill>
@@ -16205,6 +16189,85 @@
             <a:endParaRPr lang="en-US" b="1" u="sng" dirty="0">
               <a:solidFill>
                 <a:srgbClr val="FF0000"/>
+              </a:solidFill>
+            </a:endParaRPr>
+          </a:p>
+        </p:txBody>
+      </p:sp>
+      <p:sp>
+        <p:nvSpPr>
+          <p:cNvPr id="18" name="Rechteck 17"/>
+          <p:cNvSpPr/>
+          <p:nvPr/>
+        </p:nvSpPr>
+        <p:spPr>
+          <a:xfrm>
+            <a:off x="2618951" y="4305956"/>
+            <a:ext cx="1965173" cy="698376"/>
+          </a:xfrm>
+          <a:prstGeom prst="rect">
+            <a:avLst/>
+          </a:prstGeom>
+          <a:solidFill>
+            <a:schemeClr val="tx1"/>
+          </a:solidFill>
+        </p:spPr>
+        <p:style>
+          <a:lnRef idx="2">
+            <a:schemeClr val="accent1">
+              <a:shade val="50000"/>
+            </a:schemeClr>
+          </a:lnRef>
+          <a:fillRef idx="1">
+            <a:schemeClr val="accent1"/>
+          </a:fillRef>
+          <a:effectRef idx="0">
+            <a:schemeClr val="accent1"/>
+          </a:effectRef>
+          <a:fontRef idx="minor">
+            <a:schemeClr val="lt1"/>
+          </a:fontRef>
+        </p:style>
+        <p:txBody>
+          <a:bodyPr rtlCol="0" anchor="ctr"/>
+          <a:lstStyle/>
+          <a:p>
+            <a:pPr algn="ctr"/>
+            <a:r>
+              <a:rPr lang="de-DE" sz="1400" b="1" dirty="0" smtClean="0">
+                <a:solidFill>
+                  <a:schemeClr val="bg1"/>
+                </a:solidFill>
+              </a:rPr>
+              <a:t>User </a:t>
+            </a:r>
+            <a:r>
+              <a:rPr lang="de-DE" sz="1400" b="1" dirty="0" err="1" smtClean="0">
+                <a:solidFill>
+                  <a:schemeClr val="bg1"/>
+                </a:solidFill>
+              </a:rPr>
+              <a:t>street</a:t>
+            </a:r>
+            <a:r>
+              <a:rPr lang="de-DE" sz="1400" b="1" dirty="0" smtClean="0">
+                <a:solidFill>
+                  <a:schemeClr val="bg1"/>
+                </a:solidFill>
+              </a:rPr>
+              <a:t> </a:t>
+            </a:r>
+            <a:r>
+              <a:rPr lang="de-DE" sz="1400" b="1" dirty="0" err="1" smtClean="0">
+                <a:solidFill>
+                  <a:schemeClr val="bg1"/>
+                </a:solidFill>
+              </a:rPr>
+              <a:t>number</a:t>
+            </a:r>
+            <a:endParaRPr lang="en-US" sz="1400" b="1" dirty="0">
+              <a:solidFill>
+                <a:schemeClr val="bg1"/>
               </a:solidFill>
             </a:endParaRPr>
           </a:p>

</xml_diff>

<commit_message>
added component for user registration
</commit_message>
<xml_diff>
--- a/PraesentationsConceptual/ProjectPraesentation.pptx
+++ b/PraesentationsConceptual/ProjectPraesentation.pptx
@@ -507,7 +507,7 @@
           <a:p>
             <a:fld id="{DE46CDDC-32D5-4297-B268-762470F0F4D3}" type="datetimeFigureOut">
               <a:rPr lang="de-DE" smtClean="0"/>
-              <a:t>08.07.2020</a:t>
+              <a:t>09.07.2020</a:t>
             </a:fld>
             <a:endParaRPr lang="de-DE"/>
           </a:p>
@@ -672,7 +672,7 @@
           <a:p>
             <a:fld id="{DE46CDDC-32D5-4297-B268-762470F0F4D3}" type="datetimeFigureOut">
               <a:rPr lang="de-DE" smtClean="0"/>
-              <a:t>08.07.2020</a:t>
+              <a:t>09.07.2020</a:t>
             </a:fld>
             <a:endParaRPr lang="de-DE"/>
           </a:p>
@@ -847,7 +847,7 @@
           <a:p>
             <a:fld id="{DE46CDDC-32D5-4297-B268-762470F0F4D3}" type="datetimeFigureOut">
               <a:rPr lang="de-DE" smtClean="0"/>
-              <a:t>08.07.2020</a:t>
+              <a:t>09.07.2020</a:t>
             </a:fld>
             <a:endParaRPr lang="de-DE"/>
           </a:p>
@@ -1016,7 +1016,7 @@
           <a:p>
             <a:fld id="{DE46CDDC-32D5-4297-B268-762470F0F4D3}" type="datetimeFigureOut">
               <a:rPr lang="de-DE" smtClean="0"/>
-              <a:t>08.07.2020</a:t>
+              <a:t>09.07.2020</a:t>
             </a:fld>
             <a:endParaRPr lang="de-DE"/>
           </a:p>
@@ -1471,7 +1471,7 @@
           <a:p>
             <a:fld id="{DE46CDDC-32D5-4297-B268-762470F0F4D3}" type="datetimeFigureOut">
               <a:rPr lang="de-DE" smtClean="0"/>
-              <a:t>08.07.2020</a:t>
+              <a:t>09.07.2020</a:t>
             </a:fld>
             <a:endParaRPr lang="de-DE"/>
           </a:p>
@@ -1735,7 +1735,7 @@
           <a:p>
             <a:fld id="{DE46CDDC-32D5-4297-B268-762470F0F4D3}" type="datetimeFigureOut">
               <a:rPr lang="de-DE" smtClean="0"/>
-              <a:t>08.07.2020</a:t>
+              <a:t>09.07.2020</a:t>
             </a:fld>
             <a:endParaRPr lang="de-DE"/>
           </a:p>
@@ -2109,7 +2109,7 @@
           <a:p>
             <a:fld id="{DE46CDDC-32D5-4297-B268-762470F0F4D3}" type="datetimeFigureOut">
               <a:rPr lang="de-DE" smtClean="0"/>
-              <a:t>08.07.2020</a:t>
+              <a:t>09.07.2020</a:t>
             </a:fld>
             <a:endParaRPr lang="de-DE"/>
           </a:p>
@@ -2231,7 +2231,7 @@
           <a:p>
             <a:fld id="{DE46CDDC-32D5-4297-B268-762470F0F4D3}" type="datetimeFigureOut">
               <a:rPr lang="de-DE" smtClean="0"/>
-              <a:t>08.07.2020</a:t>
+              <a:t>09.07.2020</a:t>
             </a:fld>
             <a:endParaRPr lang="de-DE"/>
           </a:p>
@@ -2321,7 +2321,7 @@
           <a:p>
             <a:fld id="{DE46CDDC-32D5-4297-B268-762470F0F4D3}" type="datetimeFigureOut">
               <a:rPr lang="de-DE" smtClean="0"/>
-              <a:t>08.07.2020</a:t>
+              <a:t>09.07.2020</a:t>
             </a:fld>
             <a:endParaRPr lang="de-DE"/>
           </a:p>
@@ -2570,7 +2570,7 @@
           <a:p>
             <a:fld id="{DE46CDDC-32D5-4297-B268-762470F0F4D3}" type="datetimeFigureOut">
               <a:rPr lang="de-DE" smtClean="0"/>
-              <a:t>08.07.2020</a:t>
+              <a:t>09.07.2020</a:t>
             </a:fld>
             <a:endParaRPr lang="de-DE"/>
           </a:p>
@@ -2829,7 +2829,7 @@
           <a:p>
             <a:fld id="{DE46CDDC-32D5-4297-B268-762470F0F4D3}" type="datetimeFigureOut">
               <a:rPr lang="de-DE" smtClean="0"/>
-              <a:t>08.07.2020</a:t>
+              <a:t>09.07.2020</a:t>
             </a:fld>
             <a:endParaRPr lang="de-DE"/>
           </a:p>
@@ -3233,7 +3233,7 @@
           <a:p>
             <a:fld id="{DE46CDDC-32D5-4297-B268-762470F0F4D3}" type="datetimeFigureOut">
               <a:rPr lang="de-DE" smtClean="0"/>
-              <a:t>08.07.2020</a:t>
+              <a:t>09.07.2020</a:t>
             </a:fld>
             <a:endParaRPr lang="de-DE"/>
           </a:p>
@@ -15627,7 +15627,7 @@
         </p:nvSpPr>
         <p:spPr>
           <a:xfrm>
-            <a:off x="323528" y="2346813"/>
+            <a:off x="2639908" y="1484784"/>
             <a:ext cx="1944216" cy="698376"/>
           </a:xfrm>
           <a:prstGeom prst="rect">
@@ -15690,7 +15690,7 @@
         </p:nvSpPr>
         <p:spPr>
           <a:xfrm>
-            <a:off x="323469" y="4305956"/>
+            <a:off x="375957" y="3907551"/>
             <a:ext cx="1944216" cy="496817"/>
           </a:xfrm>
           <a:prstGeom prst="rect">
@@ -15753,7 +15753,7 @@
         </p:nvSpPr>
         <p:spPr>
           <a:xfrm>
-            <a:off x="323528" y="3155268"/>
+            <a:off x="380712" y="4581128"/>
             <a:ext cx="1944216" cy="417748"/>
           </a:xfrm>
           <a:prstGeom prst="rect">
@@ -15808,7 +15808,7 @@
         </p:nvSpPr>
         <p:spPr>
           <a:xfrm>
-            <a:off x="333035" y="3717032"/>
+            <a:off x="323528" y="2348880"/>
             <a:ext cx="1944216" cy="504056"/>
           </a:xfrm>
           <a:prstGeom prst="rect">
@@ -15863,7 +15863,7 @@
         </p:nvSpPr>
         <p:spPr>
           <a:xfrm>
-            <a:off x="312078" y="5443014"/>
+            <a:off x="355000" y="3014954"/>
             <a:ext cx="1965173" cy="698376"/>
           </a:xfrm>
           <a:prstGeom prst="rect">
@@ -15942,8 +15942,8 @@
         </p:nvSpPr>
         <p:spPr>
           <a:xfrm>
-            <a:off x="323469" y="4941168"/>
-            <a:ext cx="1953782" cy="349188"/>
+            <a:off x="2639908" y="2341372"/>
+            <a:ext cx="1953782" cy="511564"/>
           </a:xfrm>
           <a:prstGeom prst="rect">
             <a:avLst/>
@@ -15997,7 +15997,7 @@
         </p:nvSpPr>
         <p:spPr>
           <a:xfrm>
-            <a:off x="2519772" y="1484784"/>
+            <a:off x="5076056" y="1484784"/>
             <a:ext cx="2052228" cy="2645814"/>
           </a:xfrm>
           <a:prstGeom prst="rect">
@@ -16112,7 +16112,7 @@
         </p:nvSpPr>
         <p:spPr>
           <a:xfrm>
-            <a:off x="4463988" y="5085184"/>
+            <a:off x="2238198" y="5445224"/>
             <a:ext cx="4176464" cy="1080120"/>
           </a:xfrm>
           <a:prstGeom prst="ellipse">
@@ -16202,7 +16202,7 @@
         </p:nvSpPr>
         <p:spPr>
           <a:xfrm>
-            <a:off x="2618951" y="4305956"/>
+            <a:off x="2585999" y="3014954"/>
             <a:ext cx="1965173" cy="698376"/>
           </a:xfrm>
           <a:prstGeom prst="rect">

</xml_diff>